<commit_message>
implemented instructions as pptx
</commit_message>
<xml_diff>
--- a/instructions/instructionsDiapo.pptx
+++ b/instructions/instructionsDiapo.pptx
@@ -32,7 +32,7 @@
     <a:defPPr>
       <a:defRPr lang="fr-FR"/>
     </a:defPPr>
-    <a:lvl1pPr marL="0" algn="l" defTabSz="914400" rtl="0" eaLnBrk="1" latinLnBrk="0" hangingPunct="1">
+    <a:lvl1pPr marL="0" algn="l" defTabSz="914357" rtl="0" eaLnBrk="1" latinLnBrk="0" hangingPunct="1">
       <a:defRPr sz="1800" kern="1200">
         <a:solidFill>
           <a:schemeClr val="tx1"/>
@@ -42,7 +42,7 @@
         <a:cs typeface="+mn-cs"/>
       </a:defRPr>
     </a:lvl1pPr>
-    <a:lvl2pPr marL="457200" algn="l" defTabSz="914400" rtl="0" eaLnBrk="1" latinLnBrk="0" hangingPunct="1">
+    <a:lvl2pPr marL="457178" algn="l" defTabSz="914357" rtl="0" eaLnBrk="1" latinLnBrk="0" hangingPunct="1">
       <a:defRPr sz="1800" kern="1200">
         <a:solidFill>
           <a:schemeClr val="tx1"/>
@@ -52,7 +52,7 @@
         <a:cs typeface="+mn-cs"/>
       </a:defRPr>
     </a:lvl2pPr>
-    <a:lvl3pPr marL="914400" algn="l" defTabSz="914400" rtl="0" eaLnBrk="1" latinLnBrk="0" hangingPunct="1">
+    <a:lvl3pPr marL="914357" algn="l" defTabSz="914357" rtl="0" eaLnBrk="1" latinLnBrk="0" hangingPunct="1">
       <a:defRPr sz="1800" kern="1200">
         <a:solidFill>
           <a:schemeClr val="tx1"/>
@@ -62,7 +62,7 @@
         <a:cs typeface="+mn-cs"/>
       </a:defRPr>
     </a:lvl3pPr>
-    <a:lvl4pPr marL="1371600" algn="l" defTabSz="914400" rtl="0" eaLnBrk="1" latinLnBrk="0" hangingPunct="1">
+    <a:lvl4pPr marL="1371536" algn="l" defTabSz="914357" rtl="0" eaLnBrk="1" latinLnBrk="0" hangingPunct="1">
       <a:defRPr sz="1800" kern="1200">
         <a:solidFill>
           <a:schemeClr val="tx1"/>
@@ -72,7 +72,7 @@
         <a:cs typeface="+mn-cs"/>
       </a:defRPr>
     </a:lvl4pPr>
-    <a:lvl5pPr marL="1828800" algn="l" defTabSz="914400" rtl="0" eaLnBrk="1" latinLnBrk="0" hangingPunct="1">
+    <a:lvl5pPr marL="1828714" algn="l" defTabSz="914357" rtl="0" eaLnBrk="1" latinLnBrk="0" hangingPunct="1">
       <a:defRPr sz="1800" kern="1200">
         <a:solidFill>
           <a:schemeClr val="tx1"/>
@@ -82,7 +82,7 @@
         <a:cs typeface="+mn-cs"/>
       </a:defRPr>
     </a:lvl5pPr>
-    <a:lvl6pPr marL="2286000" algn="l" defTabSz="914400" rtl="0" eaLnBrk="1" latinLnBrk="0" hangingPunct="1">
+    <a:lvl6pPr marL="2285892" algn="l" defTabSz="914357" rtl="0" eaLnBrk="1" latinLnBrk="0" hangingPunct="1">
       <a:defRPr sz="1800" kern="1200">
         <a:solidFill>
           <a:schemeClr val="tx1"/>
@@ -92,7 +92,7 @@
         <a:cs typeface="+mn-cs"/>
       </a:defRPr>
     </a:lvl6pPr>
-    <a:lvl7pPr marL="2743200" algn="l" defTabSz="914400" rtl="0" eaLnBrk="1" latinLnBrk="0" hangingPunct="1">
+    <a:lvl7pPr marL="2743070" algn="l" defTabSz="914357" rtl="0" eaLnBrk="1" latinLnBrk="0" hangingPunct="1">
       <a:defRPr sz="1800" kern="1200">
         <a:solidFill>
           <a:schemeClr val="tx1"/>
@@ -102,7 +102,7 @@
         <a:cs typeface="+mn-cs"/>
       </a:defRPr>
     </a:lvl7pPr>
-    <a:lvl8pPr marL="3200400" algn="l" defTabSz="914400" rtl="0" eaLnBrk="1" latinLnBrk="0" hangingPunct="1">
+    <a:lvl8pPr marL="3200249" algn="l" defTabSz="914357" rtl="0" eaLnBrk="1" latinLnBrk="0" hangingPunct="1">
       <a:defRPr sz="1800" kern="1200">
         <a:solidFill>
           <a:schemeClr val="tx1"/>
@@ -112,7 +112,7 @@
         <a:cs typeface="+mn-cs"/>
       </a:defRPr>
     </a:lvl8pPr>
-    <a:lvl9pPr marL="3657600" algn="l" defTabSz="914400" rtl="0" eaLnBrk="1" latinLnBrk="0" hangingPunct="1">
+    <a:lvl9pPr marL="3657428" algn="l" defTabSz="914357" rtl="0" eaLnBrk="1" latinLnBrk="0" hangingPunct="1">
       <a:defRPr sz="1800" kern="1200">
         <a:solidFill>
           <a:schemeClr val="tx1"/>
@@ -198,35 +198,35 @@
               <a:buNone/>
               <a:defRPr sz="2400"/>
             </a:lvl1pPr>
-            <a:lvl2pPr marL="457200" indent="0" algn="ctr">
+            <a:lvl2pPr marL="457209" indent="0" algn="ctr">
               <a:buNone/>
               <a:defRPr sz="2000"/>
             </a:lvl2pPr>
-            <a:lvl3pPr marL="914400" indent="0" algn="ctr">
+            <a:lvl3pPr marL="914418" indent="0" algn="ctr">
               <a:buNone/>
               <a:defRPr sz="1800"/>
             </a:lvl3pPr>
-            <a:lvl4pPr marL="1371600" indent="0" algn="ctr">
+            <a:lvl4pPr marL="1371627" indent="0" algn="ctr">
               <a:buNone/>
               <a:defRPr sz="1600"/>
             </a:lvl4pPr>
-            <a:lvl5pPr marL="1828800" indent="0" algn="ctr">
+            <a:lvl5pPr marL="1828837" indent="0" algn="ctr">
               <a:buNone/>
               <a:defRPr sz="1600"/>
             </a:lvl5pPr>
-            <a:lvl6pPr marL="2286000" indent="0" algn="ctr">
+            <a:lvl6pPr marL="2286046" indent="0" algn="ctr">
               <a:buNone/>
               <a:defRPr sz="1600"/>
             </a:lvl6pPr>
-            <a:lvl7pPr marL="2743200" indent="0" algn="ctr">
+            <a:lvl7pPr marL="2743255" indent="0" algn="ctr">
               <a:buNone/>
               <a:defRPr sz="1600"/>
             </a:lvl7pPr>
-            <a:lvl8pPr marL="3200400" indent="0" algn="ctr">
+            <a:lvl8pPr marL="3200464" indent="0" algn="ctr">
               <a:buNone/>
               <a:defRPr sz="1600"/>
             </a:lvl8pPr>
-            <a:lvl9pPr marL="3657600" indent="0" algn="ctr">
+            <a:lvl9pPr marL="3657673" indent="0" algn="ctr">
               <a:buNone/>
               <a:defRPr sz="1600"/>
             </a:lvl9pPr>
@@ -867,7 +867,7 @@
         </p:nvSpPr>
         <p:spPr>
           <a:xfrm>
-            <a:off x="831850" y="1709738"/>
+            <a:off x="831850" y="1709739"/>
             <a:ext cx="10515600" cy="2852737"/>
           </a:xfrm>
         </p:spPr>
@@ -899,7 +899,7 @@
         </p:nvSpPr>
         <p:spPr>
           <a:xfrm>
-            <a:off x="831850" y="4589463"/>
+            <a:off x="831850" y="4589464"/>
             <a:ext cx="10515600" cy="1500187"/>
           </a:xfrm>
         </p:spPr>
@@ -916,7 +916,7 @@
                 </a:solidFill>
               </a:defRPr>
             </a:lvl1pPr>
-            <a:lvl2pPr marL="457200" indent="0">
+            <a:lvl2pPr marL="457209" indent="0">
               <a:buNone/>
               <a:defRPr sz="2000">
                 <a:solidFill>
@@ -926,7 +926,7 @@
                 </a:solidFill>
               </a:defRPr>
             </a:lvl2pPr>
-            <a:lvl3pPr marL="914400" indent="0">
+            <a:lvl3pPr marL="914418" indent="0">
               <a:buNone/>
               <a:defRPr sz="1800">
                 <a:solidFill>
@@ -936,7 +936,7 @@
                 </a:solidFill>
               </a:defRPr>
             </a:lvl3pPr>
-            <a:lvl4pPr marL="1371600" indent="0">
+            <a:lvl4pPr marL="1371627" indent="0">
               <a:buNone/>
               <a:defRPr sz="1600">
                 <a:solidFill>
@@ -946,7 +946,7 @@
                 </a:solidFill>
               </a:defRPr>
             </a:lvl4pPr>
-            <a:lvl5pPr marL="1828800" indent="0">
+            <a:lvl5pPr marL="1828837" indent="0">
               <a:buNone/>
               <a:defRPr sz="1600">
                 <a:solidFill>
@@ -956,7 +956,7 @@
                 </a:solidFill>
               </a:defRPr>
             </a:lvl5pPr>
-            <a:lvl6pPr marL="2286000" indent="0">
+            <a:lvl6pPr marL="2286046" indent="0">
               <a:buNone/>
               <a:defRPr sz="1600">
                 <a:solidFill>
@@ -966,7 +966,7 @@
                 </a:solidFill>
               </a:defRPr>
             </a:lvl6pPr>
-            <a:lvl7pPr marL="2743200" indent="0">
+            <a:lvl7pPr marL="2743255" indent="0">
               <a:buNone/>
               <a:defRPr sz="1600">
                 <a:solidFill>
@@ -976,7 +976,7 @@
                 </a:solidFill>
               </a:defRPr>
             </a:lvl7pPr>
-            <a:lvl8pPr marL="3200400" indent="0">
+            <a:lvl8pPr marL="3200464" indent="0">
               <a:buNone/>
               <a:defRPr sz="1600">
                 <a:solidFill>
@@ -986,7 +986,7 @@
                 </a:solidFill>
               </a:defRPr>
             </a:lvl8pPr>
-            <a:lvl9pPr marL="3657600" indent="0">
+            <a:lvl9pPr marL="3657673" indent="0">
               <a:buNone/>
               <a:defRPr sz="1600">
                 <a:solidFill>
@@ -1345,7 +1345,7 @@
         </p:nvSpPr>
         <p:spPr>
           <a:xfrm>
-            <a:off x="839788" y="365125"/>
+            <a:off x="839788" y="365126"/>
             <a:ext cx="10515600" cy="1325563"/>
           </a:xfrm>
         </p:spPr>
@@ -1384,35 +1384,35 @@
               <a:buNone/>
               <a:defRPr sz="2400" b="1"/>
             </a:lvl1pPr>
-            <a:lvl2pPr marL="457200" indent="0">
+            <a:lvl2pPr marL="457209" indent="0">
               <a:buNone/>
               <a:defRPr sz="2000" b="1"/>
             </a:lvl2pPr>
-            <a:lvl3pPr marL="914400" indent="0">
+            <a:lvl3pPr marL="914418" indent="0">
               <a:buNone/>
               <a:defRPr sz="1800" b="1"/>
             </a:lvl3pPr>
-            <a:lvl4pPr marL="1371600" indent="0">
+            <a:lvl4pPr marL="1371627" indent="0">
               <a:buNone/>
               <a:defRPr sz="1600" b="1"/>
             </a:lvl4pPr>
-            <a:lvl5pPr marL="1828800" indent="0">
+            <a:lvl5pPr marL="1828837" indent="0">
               <a:buNone/>
               <a:defRPr sz="1600" b="1"/>
             </a:lvl5pPr>
-            <a:lvl6pPr marL="2286000" indent="0">
+            <a:lvl6pPr marL="2286046" indent="0">
               <a:buNone/>
               <a:defRPr sz="1600" b="1"/>
             </a:lvl6pPr>
-            <a:lvl7pPr marL="2743200" indent="0">
+            <a:lvl7pPr marL="2743255" indent="0">
               <a:buNone/>
               <a:defRPr sz="1600" b="1"/>
             </a:lvl7pPr>
-            <a:lvl8pPr marL="3200400" indent="0">
+            <a:lvl8pPr marL="3200464" indent="0">
               <a:buNone/>
               <a:defRPr sz="1600" b="1"/>
             </a:lvl8pPr>
-            <a:lvl9pPr marL="3657600" indent="0">
+            <a:lvl9pPr marL="3657673" indent="0">
               <a:buNone/>
               <a:defRPr sz="1600" b="1"/>
             </a:lvl9pPr>
@@ -1506,35 +1506,35 @@
               <a:buNone/>
               <a:defRPr sz="2400" b="1"/>
             </a:lvl1pPr>
-            <a:lvl2pPr marL="457200" indent="0">
+            <a:lvl2pPr marL="457209" indent="0">
               <a:buNone/>
               <a:defRPr sz="2000" b="1"/>
             </a:lvl2pPr>
-            <a:lvl3pPr marL="914400" indent="0">
+            <a:lvl3pPr marL="914418" indent="0">
               <a:buNone/>
               <a:defRPr sz="1800" b="1"/>
             </a:lvl3pPr>
-            <a:lvl4pPr marL="1371600" indent="0">
+            <a:lvl4pPr marL="1371627" indent="0">
               <a:buNone/>
               <a:defRPr sz="1600" b="1"/>
             </a:lvl4pPr>
-            <a:lvl5pPr marL="1828800" indent="0">
+            <a:lvl5pPr marL="1828837" indent="0">
               <a:buNone/>
               <a:defRPr sz="1600" b="1"/>
             </a:lvl5pPr>
-            <a:lvl6pPr marL="2286000" indent="0">
+            <a:lvl6pPr marL="2286046" indent="0">
               <a:buNone/>
               <a:defRPr sz="1600" b="1"/>
             </a:lvl6pPr>
-            <a:lvl7pPr marL="2743200" indent="0">
+            <a:lvl7pPr marL="2743255" indent="0">
               <a:buNone/>
               <a:defRPr sz="1600" b="1"/>
             </a:lvl7pPr>
-            <a:lvl8pPr marL="3200400" indent="0">
+            <a:lvl8pPr marL="3200464" indent="0">
               <a:buNone/>
               <a:defRPr sz="1600" b="1"/>
             </a:lvl8pPr>
-            <a:lvl9pPr marL="3657600" indent="0">
+            <a:lvl9pPr marL="3657673" indent="0">
               <a:buNone/>
               <a:defRPr sz="1600" b="1"/>
             </a:lvl9pPr>
@@ -1925,7 +1925,7 @@
         </p:nvSpPr>
         <p:spPr>
           <a:xfrm>
-            <a:off x="839788" y="457200"/>
+            <a:off x="839789" y="457200"/>
             <a:ext cx="3932237" cy="1600200"/>
           </a:xfrm>
         </p:spPr>
@@ -1957,7 +1957,7 @@
         </p:nvSpPr>
         <p:spPr>
           <a:xfrm>
-            <a:off x="5183188" y="987425"/>
+            <a:off x="5183188" y="987426"/>
             <a:ext cx="6172200" cy="4873625"/>
           </a:xfrm>
         </p:spPr>
@@ -2042,7 +2042,7 @@
         </p:nvSpPr>
         <p:spPr>
           <a:xfrm>
-            <a:off x="839788" y="2057400"/>
+            <a:off x="839789" y="2057400"/>
             <a:ext cx="3932237" cy="3811588"/>
           </a:xfrm>
         </p:spPr>
@@ -2053,35 +2053,35 @@
               <a:buNone/>
               <a:defRPr sz="1600"/>
             </a:lvl1pPr>
-            <a:lvl2pPr marL="457200" indent="0">
+            <a:lvl2pPr marL="457209" indent="0">
               <a:buNone/>
               <a:defRPr sz="1400"/>
             </a:lvl2pPr>
-            <a:lvl3pPr marL="914400" indent="0">
+            <a:lvl3pPr marL="914418" indent="0">
               <a:buNone/>
               <a:defRPr sz="1200"/>
             </a:lvl3pPr>
-            <a:lvl4pPr marL="1371600" indent="0">
+            <a:lvl4pPr marL="1371627" indent="0">
               <a:buNone/>
               <a:defRPr sz="1000"/>
             </a:lvl4pPr>
-            <a:lvl5pPr marL="1828800" indent="0">
+            <a:lvl5pPr marL="1828837" indent="0">
               <a:buNone/>
               <a:defRPr sz="1000"/>
             </a:lvl5pPr>
-            <a:lvl6pPr marL="2286000" indent="0">
+            <a:lvl6pPr marL="2286046" indent="0">
               <a:buNone/>
               <a:defRPr sz="1000"/>
             </a:lvl6pPr>
-            <a:lvl7pPr marL="2743200" indent="0">
+            <a:lvl7pPr marL="2743255" indent="0">
               <a:buNone/>
               <a:defRPr sz="1000"/>
             </a:lvl7pPr>
-            <a:lvl8pPr marL="3200400" indent="0">
+            <a:lvl8pPr marL="3200464" indent="0">
               <a:buNone/>
               <a:defRPr sz="1000"/>
             </a:lvl8pPr>
-            <a:lvl9pPr marL="3657600" indent="0">
+            <a:lvl9pPr marL="3657673" indent="0">
               <a:buNone/>
               <a:defRPr sz="1000"/>
             </a:lvl9pPr>
@@ -2202,7 +2202,7 @@
         </p:nvSpPr>
         <p:spPr>
           <a:xfrm>
-            <a:off x="839788" y="457200"/>
+            <a:off x="839789" y="457200"/>
             <a:ext cx="3932237" cy="1600200"/>
           </a:xfrm>
         </p:spPr>
@@ -2234,7 +2234,7 @@
         </p:nvSpPr>
         <p:spPr>
           <a:xfrm>
-            <a:off x="5183188" y="987425"/>
+            <a:off x="5183188" y="987426"/>
             <a:ext cx="6172200" cy="4873625"/>
           </a:xfrm>
         </p:spPr>
@@ -2245,35 +2245,35 @@
               <a:buNone/>
               <a:defRPr sz="3200"/>
             </a:lvl1pPr>
-            <a:lvl2pPr marL="457200" indent="0">
+            <a:lvl2pPr marL="457209" indent="0">
               <a:buNone/>
               <a:defRPr sz="2800"/>
             </a:lvl2pPr>
-            <a:lvl3pPr marL="914400" indent="0">
+            <a:lvl3pPr marL="914418" indent="0">
               <a:buNone/>
               <a:defRPr sz="2400"/>
             </a:lvl3pPr>
-            <a:lvl4pPr marL="1371600" indent="0">
+            <a:lvl4pPr marL="1371627" indent="0">
               <a:buNone/>
               <a:defRPr sz="2000"/>
             </a:lvl4pPr>
-            <a:lvl5pPr marL="1828800" indent="0">
+            <a:lvl5pPr marL="1828837" indent="0">
               <a:buNone/>
               <a:defRPr sz="2000"/>
             </a:lvl5pPr>
-            <a:lvl6pPr marL="2286000" indent="0">
+            <a:lvl6pPr marL="2286046" indent="0">
               <a:buNone/>
               <a:defRPr sz="2000"/>
             </a:lvl6pPr>
-            <a:lvl7pPr marL="2743200" indent="0">
+            <a:lvl7pPr marL="2743255" indent="0">
               <a:buNone/>
               <a:defRPr sz="2000"/>
             </a:lvl7pPr>
-            <a:lvl8pPr marL="3200400" indent="0">
+            <a:lvl8pPr marL="3200464" indent="0">
               <a:buNone/>
               <a:defRPr sz="2000"/>
             </a:lvl8pPr>
-            <a:lvl9pPr marL="3657600" indent="0">
+            <a:lvl9pPr marL="3657673" indent="0">
               <a:buNone/>
               <a:defRPr sz="2000"/>
             </a:lvl9pPr>
@@ -2295,7 +2295,7 @@
         </p:nvSpPr>
         <p:spPr>
           <a:xfrm>
-            <a:off x="839788" y="2057400"/>
+            <a:off x="839789" y="2057400"/>
             <a:ext cx="3932237" cy="3811588"/>
           </a:xfrm>
         </p:spPr>
@@ -2306,35 +2306,35 @@
               <a:buNone/>
               <a:defRPr sz="1600"/>
             </a:lvl1pPr>
-            <a:lvl2pPr marL="457200" indent="0">
+            <a:lvl2pPr marL="457209" indent="0">
               <a:buNone/>
               <a:defRPr sz="1400"/>
             </a:lvl2pPr>
-            <a:lvl3pPr marL="914400" indent="0">
+            <a:lvl3pPr marL="914418" indent="0">
               <a:buNone/>
               <a:defRPr sz="1200"/>
             </a:lvl3pPr>
-            <a:lvl4pPr marL="1371600" indent="0">
+            <a:lvl4pPr marL="1371627" indent="0">
               <a:buNone/>
               <a:defRPr sz="1000"/>
             </a:lvl4pPr>
-            <a:lvl5pPr marL="1828800" indent="0">
+            <a:lvl5pPr marL="1828837" indent="0">
               <a:buNone/>
               <a:defRPr sz="1000"/>
             </a:lvl5pPr>
-            <a:lvl6pPr marL="2286000" indent="0">
+            <a:lvl6pPr marL="2286046" indent="0">
               <a:buNone/>
               <a:defRPr sz="1000"/>
             </a:lvl6pPr>
-            <a:lvl7pPr marL="2743200" indent="0">
+            <a:lvl7pPr marL="2743255" indent="0">
               <a:buNone/>
               <a:defRPr sz="1000"/>
             </a:lvl7pPr>
-            <a:lvl8pPr marL="3200400" indent="0">
+            <a:lvl8pPr marL="3200464" indent="0">
               <a:buNone/>
               <a:defRPr sz="1000"/>
             </a:lvl8pPr>
-            <a:lvl9pPr marL="3657600" indent="0">
+            <a:lvl9pPr marL="3657673" indent="0">
               <a:buNone/>
               <a:defRPr sz="1000"/>
             </a:lvl9pPr>
@@ -2460,7 +2460,7 @@
         </p:nvSpPr>
         <p:spPr>
           <a:xfrm>
-            <a:off x="838200" y="365125"/>
+            <a:off x="838200" y="365126"/>
             <a:ext cx="10515600" cy="1325563"/>
           </a:xfrm>
           <a:prstGeom prst="rect">
@@ -2555,7 +2555,7 @@
         </p:nvSpPr>
         <p:spPr>
           <a:xfrm>
-            <a:off x="838200" y="6356350"/>
+            <a:off x="838200" y="6356351"/>
             <a:ext cx="2743200" cy="365125"/>
           </a:xfrm>
           <a:prstGeom prst="rect">
@@ -2596,7 +2596,7 @@
         </p:nvSpPr>
         <p:spPr>
           <a:xfrm>
-            <a:off x="4038600" y="6356350"/>
+            <a:off x="4038600" y="6356351"/>
             <a:ext cx="4114800" cy="365125"/>
           </a:xfrm>
           <a:prstGeom prst="rect">
@@ -2633,7 +2633,7 @@
         </p:nvSpPr>
         <p:spPr>
           <a:xfrm>
-            <a:off x="8610600" y="6356350"/>
+            <a:off x="8610600" y="6356351"/>
             <a:ext cx="2743200" cy="365125"/>
           </a:xfrm>
           <a:prstGeom prst="rect">
@@ -2685,7 +2685,7 @@
   </p:sldLayoutIdLst>
   <p:txStyles>
     <p:titleStyle>
-      <a:lvl1pPr algn="l" defTabSz="914400" rtl="0" eaLnBrk="1" latinLnBrk="0" hangingPunct="1">
+      <a:lvl1pPr algn="l" defTabSz="914418" rtl="0" eaLnBrk="1" latinLnBrk="0" hangingPunct="1">
         <a:lnSpc>
           <a:spcPct val="90000"/>
         </a:lnSpc>
@@ -2704,7 +2704,7 @@
       </a:lvl1pPr>
     </p:titleStyle>
     <p:bodyStyle>
-      <a:lvl1pPr marL="228600" indent="-228600" algn="l" defTabSz="914400" rtl="0" eaLnBrk="1" latinLnBrk="0" hangingPunct="1">
+      <a:lvl1pPr marL="228605" indent="-228605" algn="l" defTabSz="914418" rtl="0" eaLnBrk="1" latinLnBrk="0" hangingPunct="1">
         <a:lnSpc>
           <a:spcPct val="90000"/>
         </a:lnSpc>
@@ -2722,7 +2722,7 @@
           <a:cs typeface="+mn-cs"/>
         </a:defRPr>
       </a:lvl1pPr>
-      <a:lvl2pPr marL="685800" indent="-228600" algn="l" defTabSz="914400" rtl="0" eaLnBrk="1" latinLnBrk="0" hangingPunct="1">
+      <a:lvl2pPr marL="685814" indent="-228605" algn="l" defTabSz="914418" rtl="0" eaLnBrk="1" latinLnBrk="0" hangingPunct="1">
         <a:lnSpc>
           <a:spcPct val="90000"/>
         </a:lnSpc>
@@ -2740,7 +2740,7 @@
           <a:cs typeface="+mn-cs"/>
         </a:defRPr>
       </a:lvl2pPr>
-      <a:lvl3pPr marL="1143000" indent="-228600" algn="l" defTabSz="914400" rtl="0" eaLnBrk="1" latinLnBrk="0" hangingPunct="1">
+      <a:lvl3pPr marL="1143023" indent="-228605" algn="l" defTabSz="914418" rtl="0" eaLnBrk="1" latinLnBrk="0" hangingPunct="1">
         <a:lnSpc>
           <a:spcPct val="90000"/>
         </a:lnSpc>
@@ -2758,7 +2758,7 @@
           <a:cs typeface="+mn-cs"/>
         </a:defRPr>
       </a:lvl3pPr>
-      <a:lvl4pPr marL="1600200" indent="-228600" algn="l" defTabSz="914400" rtl="0" eaLnBrk="1" latinLnBrk="0" hangingPunct="1">
+      <a:lvl4pPr marL="1600232" indent="-228605" algn="l" defTabSz="914418" rtl="0" eaLnBrk="1" latinLnBrk="0" hangingPunct="1">
         <a:lnSpc>
           <a:spcPct val="90000"/>
         </a:lnSpc>
@@ -2776,7 +2776,7 @@
           <a:cs typeface="+mn-cs"/>
         </a:defRPr>
       </a:lvl4pPr>
-      <a:lvl5pPr marL="2057400" indent="-228600" algn="l" defTabSz="914400" rtl="0" eaLnBrk="1" latinLnBrk="0" hangingPunct="1">
+      <a:lvl5pPr marL="2057441" indent="-228605" algn="l" defTabSz="914418" rtl="0" eaLnBrk="1" latinLnBrk="0" hangingPunct="1">
         <a:lnSpc>
           <a:spcPct val="90000"/>
         </a:lnSpc>
@@ -2794,7 +2794,7 @@
           <a:cs typeface="+mn-cs"/>
         </a:defRPr>
       </a:lvl5pPr>
-      <a:lvl6pPr marL="2514600" indent="-228600" algn="l" defTabSz="914400" rtl="0" eaLnBrk="1" latinLnBrk="0" hangingPunct="1">
+      <a:lvl6pPr marL="2514650" indent="-228605" algn="l" defTabSz="914418" rtl="0" eaLnBrk="1" latinLnBrk="0" hangingPunct="1">
         <a:lnSpc>
           <a:spcPct val="90000"/>
         </a:lnSpc>
@@ -2812,7 +2812,7 @@
           <a:cs typeface="+mn-cs"/>
         </a:defRPr>
       </a:lvl6pPr>
-      <a:lvl7pPr marL="2971800" indent="-228600" algn="l" defTabSz="914400" rtl="0" eaLnBrk="1" latinLnBrk="0" hangingPunct="1">
+      <a:lvl7pPr marL="2971859" indent="-228605" algn="l" defTabSz="914418" rtl="0" eaLnBrk="1" latinLnBrk="0" hangingPunct="1">
         <a:lnSpc>
           <a:spcPct val="90000"/>
         </a:lnSpc>
@@ -2830,7 +2830,7 @@
           <a:cs typeface="+mn-cs"/>
         </a:defRPr>
       </a:lvl7pPr>
-      <a:lvl8pPr marL="3429000" indent="-228600" algn="l" defTabSz="914400" rtl="0" eaLnBrk="1" latinLnBrk="0" hangingPunct="1">
+      <a:lvl8pPr marL="3429069" indent="-228605" algn="l" defTabSz="914418" rtl="0" eaLnBrk="1" latinLnBrk="0" hangingPunct="1">
         <a:lnSpc>
           <a:spcPct val="90000"/>
         </a:lnSpc>
@@ -2848,7 +2848,7 @@
           <a:cs typeface="+mn-cs"/>
         </a:defRPr>
       </a:lvl8pPr>
-      <a:lvl9pPr marL="3886200" indent="-228600" algn="l" defTabSz="914400" rtl="0" eaLnBrk="1" latinLnBrk="0" hangingPunct="1">
+      <a:lvl9pPr marL="3886278" indent="-228605" algn="l" defTabSz="914418" rtl="0" eaLnBrk="1" latinLnBrk="0" hangingPunct="1">
         <a:lnSpc>
           <a:spcPct val="90000"/>
         </a:lnSpc>
@@ -2871,7 +2871,7 @@
       <a:defPPr>
         <a:defRPr lang="fr-FR"/>
       </a:defPPr>
-      <a:lvl1pPr marL="0" algn="l" defTabSz="914400" rtl="0" eaLnBrk="1" latinLnBrk="0" hangingPunct="1">
+      <a:lvl1pPr marL="0" algn="l" defTabSz="914418" rtl="0" eaLnBrk="1" latinLnBrk="0" hangingPunct="1">
         <a:defRPr sz="1800" kern="1200">
           <a:solidFill>
             <a:schemeClr val="tx1"/>
@@ -2881,7 +2881,7 @@
           <a:cs typeface="+mn-cs"/>
         </a:defRPr>
       </a:lvl1pPr>
-      <a:lvl2pPr marL="457200" algn="l" defTabSz="914400" rtl="0" eaLnBrk="1" latinLnBrk="0" hangingPunct="1">
+      <a:lvl2pPr marL="457209" algn="l" defTabSz="914418" rtl="0" eaLnBrk="1" latinLnBrk="0" hangingPunct="1">
         <a:defRPr sz="1800" kern="1200">
           <a:solidFill>
             <a:schemeClr val="tx1"/>
@@ -2891,7 +2891,7 @@
           <a:cs typeface="+mn-cs"/>
         </a:defRPr>
       </a:lvl2pPr>
-      <a:lvl3pPr marL="914400" algn="l" defTabSz="914400" rtl="0" eaLnBrk="1" latinLnBrk="0" hangingPunct="1">
+      <a:lvl3pPr marL="914418" algn="l" defTabSz="914418" rtl="0" eaLnBrk="1" latinLnBrk="0" hangingPunct="1">
         <a:defRPr sz="1800" kern="1200">
           <a:solidFill>
             <a:schemeClr val="tx1"/>
@@ -2901,7 +2901,7 @@
           <a:cs typeface="+mn-cs"/>
         </a:defRPr>
       </a:lvl3pPr>
-      <a:lvl4pPr marL="1371600" algn="l" defTabSz="914400" rtl="0" eaLnBrk="1" latinLnBrk="0" hangingPunct="1">
+      <a:lvl4pPr marL="1371627" algn="l" defTabSz="914418" rtl="0" eaLnBrk="1" latinLnBrk="0" hangingPunct="1">
         <a:defRPr sz="1800" kern="1200">
           <a:solidFill>
             <a:schemeClr val="tx1"/>
@@ -2911,7 +2911,7 @@
           <a:cs typeface="+mn-cs"/>
         </a:defRPr>
       </a:lvl4pPr>
-      <a:lvl5pPr marL="1828800" algn="l" defTabSz="914400" rtl="0" eaLnBrk="1" latinLnBrk="0" hangingPunct="1">
+      <a:lvl5pPr marL="1828837" algn="l" defTabSz="914418" rtl="0" eaLnBrk="1" latinLnBrk="0" hangingPunct="1">
         <a:defRPr sz="1800" kern="1200">
           <a:solidFill>
             <a:schemeClr val="tx1"/>
@@ -2921,7 +2921,7 @@
           <a:cs typeface="+mn-cs"/>
         </a:defRPr>
       </a:lvl5pPr>
-      <a:lvl6pPr marL="2286000" algn="l" defTabSz="914400" rtl="0" eaLnBrk="1" latinLnBrk="0" hangingPunct="1">
+      <a:lvl6pPr marL="2286046" algn="l" defTabSz="914418" rtl="0" eaLnBrk="1" latinLnBrk="0" hangingPunct="1">
         <a:defRPr sz="1800" kern="1200">
           <a:solidFill>
             <a:schemeClr val="tx1"/>
@@ -2931,7 +2931,7 @@
           <a:cs typeface="+mn-cs"/>
         </a:defRPr>
       </a:lvl6pPr>
-      <a:lvl7pPr marL="2743200" algn="l" defTabSz="914400" rtl="0" eaLnBrk="1" latinLnBrk="0" hangingPunct="1">
+      <a:lvl7pPr marL="2743255" algn="l" defTabSz="914418" rtl="0" eaLnBrk="1" latinLnBrk="0" hangingPunct="1">
         <a:defRPr sz="1800" kern="1200">
           <a:solidFill>
             <a:schemeClr val="tx1"/>
@@ -2941,7 +2941,7 @@
           <a:cs typeface="+mn-cs"/>
         </a:defRPr>
       </a:lvl7pPr>
-      <a:lvl8pPr marL="3200400" algn="l" defTabSz="914400" rtl="0" eaLnBrk="1" latinLnBrk="0" hangingPunct="1">
+      <a:lvl8pPr marL="3200464" algn="l" defTabSz="914418" rtl="0" eaLnBrk="1" latinLnBrk="0" hangingPunct="1">
         <a:defRPr sz="1800" kern="1200">
           <a:solidFill>
             <a:schemeClr val="tx1"/>
@@ -2951,7 +2951,7 @@
           <a:cs typeface="+mn-cs"/>
         </a:defRPr>
       </a:lvl8pPr>
-      <a:lvl9pPr marL="3657600" algn="l" defTabSz="914400" rtl="0" eaLnBrk="1" latinLnBrk="0" hangingPunct="1">
+      <a:lvl9pPr marL="3657673" algn="l" defTabSz="914418" rtl="0" eaLnBrk="1" latinLnBrk="0" hangingPunct="1">
         <a:defRPr sz="1800" kern="1200">
           <a:solidFill>
             <a:schemeClr val="tx1"/>
@@ -2991,7 +2991,7 @@
         </p:nvSpPr>
         <p:spPr>
           <a:xfrm>
-            <a:off x="4121485" y="6369919"/>
+            <a:off x="4121486" y="6369919"/>
             <a:ext cx="3949030" cy="400110"/>
           </a:xfrm>
           <a:prstGeom prst="rect">
@@ -3028,7 +3028,7 @@
         </p:nvSpPr>
         <p:spPr>
           <a:xfrm>
-            <a:off x="1523999" y="1604502"/>
+            <a:off x="1523999" y="1604503"/>
             <a:ext cx="9144000" cy="1379767"/>
           </a:xfrm>
           <a:prstGeom prst="rect">
@@ -3061,7 +3061,7 @@
           <a:p>
             <a:pPr algn="ctr"/>
             <a:r>
-              <a:rPr lang="fr-FR" sz="4800" dirty="0" smtClean="0"/>
+              <a:rPr lang="fr-FR" sz="4800" dirty="0"/>
               <a:t>Bonjour ! </a:t>
             </a:r>
             <a:endParaRPr lang="fr-FR" sz="4000" dirty="0"/>
@@ -3078,7 +3078,7 @@
         </p:nvSpPr>
         <p:spPr>
           <a:xfrm>
-            <a:off x="2439785" y="3250276"/>
+            <a:off x="2439786" y="3250276"/>
             <a:ext cx="7312429" cy="1762299"/>
           </a:xfrm>
           <a:prstGeom prst="rect">
@@ -3258,7 +3258,7 @@
               <a:buNone/>
             </a:pPr>
             <a:r>
-              <a:rPr lang="fr-FR" sz="2400" dirty="0" smtClean="0"/>
+              <a:rPr lang="fr-FR" sz="2400" dirty="0"/>
               <a:t>Merci d’avoir accepté de participer à notre expérience.</a:t>
             </a:r>
           </a:p>
@@ -3266,21 +3266,21 @@
             <a:pPr marL="0" indent="0" algn="ctr">
               <a:buNone/>
             </a:pPr>
-            <a:endParaRPr lang="fr-FR" sz="2400" dirty="0" smtClean="0"/>
+            <a:endParaRPr lang="fr-FR" sz="2400" dirty="0"/>
           </a:p>
           <a:p>
             <a:pPr marL="0" indent="0" algn="ctr">
               <a:buNone/>
             </a:pPr>
             <a:r>
-              <a:rPr lang="fr-FR" sz="2400" dirty="0" smtClean="0">
+              <a:rPr lang="fr-FR" sz="2400" dirty="0">
                 <a:ea typeface="Calibri"/>
                 <a:cs typeface="Calibri"/>
                 <a:sym typeface="Calibri"/>
               </a:rPr>
               <a:t>Avant de commencer, merci de bien vouloir éteindre votre téléphone portable.</a:t>
             </a:r>
-            <a:endParaRPr lang="fr-FR" sz="2400" dirty="0" smtClean="0"/>
+            <a:endParaRPr lang="fr-FR" sz="2400" dirty="0"/>
           </a:p>
         </p:txBody>
       </p:sp>
@@ -3364,7 +3364,7 @@
         </p:nvSpPr>
         <p:spPr>
           <a:xfrm>
-            <a:off x="838199" y="1825625"/>
+            <a:off x="838200" y="1825625"/>
             <a:ext cx="10608425" cy="4351338"/>
           </a:xfrm>
         </p:spPr>
@@ -3381,19 +3381,19 @@
             <a:pPr marL="0" indent="0">
               <a:buNone/>
             </a:pPr>
-            <a:endParaRPr lang="fr-FR" sz="2000" dirty="0" smtClean="0"/>
+            <a:endParaRPr lang="fr-FR" sz="2000" dirty="0"/>
           </a:p>
           <a:p>
             <a:pPr marL="0" indent="0">
               <a:buNone/>
             </a:pPr>
             <a:r>
-              <a:rPr lang="fr-FR" sz="2000" dirty="0" smtClean="0"/>
+              <a:rPr lang="fr-FR" sz="2000" dirty="0"/>
               <a:t>Vous allez maintenant commencer le jeu. </a:t>
             </a:r>
           </a:p>
           <a:p>
-            <a:endParaRPr lang="fr-FR" sz="2000" dirty="0" smtClean="0"/>
+            <a:endParaRPr lang="fr-FR" sz="2000" dirty="0"/>
           </a:p>
           <a:p>
             <a:pPr marL="0" indent="0">
@@ -3406,12 +3406,8 @@
               <a:buNone/>
             </a:pPr>
             <a:r>
-              <a:rPr lang="fr-FR" sz="2000" dirty="0" smtClean="0"/>
-              <a:t>Rappelez-vous </a:t>
-            </a:r>
-            <a:r>
               <a:rPr lang="fr-FR" sz="2000" dirty="0"/>
-              <a:t>d’utiliser la touche [O] pour répondre « Oui » et la touche [N] pour répondre « Non ». </a:t>
+              <a:t>Rappelez-vous d’utiliser la touche [O] pour répondre « Oui » et la touche [N] pour répondre « Non ». </a:t>
             </a:r>
           </a:p>
           <a:p>
@@ -3427,7 +3423,7 @@
         </p:nvSpPr>
         <p:spPr>
           <a:xfrm>
-            <a:off x="4121485" y="6369919"/>
+            <a:off x="4121486" y="6369919"/>
             <a:ext cx="3949030" cy="400110"/>
           </a:xfrm>
           <a:prstGeom prst="rect">
@@ -3503,7 +3499,7 @@
         </p:nvSpPr>
         <p:spPr>
           <a:xfrm>
-            <a:off x="3366308" y="2718262"/>
+            <a:off x="3366308" y="2718263"/>
             <a:ext cx="5459385" cy="590203"/>
           </a:xfrm>
         </p:spPr>
@@ -3720,23 +3716,14 @@
             </a:pPr>
             <a:r>
               <a:rPr lang="fr-FR" dirty="0"/>
-              <a:t>Oui </a:t>
-            </a:r>
-            <a:r>
-              <a:rPr lang="fr-FR" dirty="0" smtClean="0"/>
-              <a:t>[O]  /  </a:t>
-            </a:r>
-            <a:r>
-              <a:rPr lang="fr-FR" dirty="0"/>
-              <a:t>Non [N]</a:t>
+              <a:t>Oui [O]  /  Non [N]</a:t>
             </a:r>
           </a:p>
           <a:p>
             <a:pPr marL="0" indent="0">
-              <a:buFont typeface="Arial" panose="020B0604020202020204" pitchFamily="34" charset="0"/>
-              <a:buNone/>
-            </a:pPr>
-            <a:endParaRPr lang="fr-FR" dirty="0" smtClean="0"/>
+              <a:buNone/>
+            </a:pPr>
+            <a:endParaRPr lang="fr-FR" dirty="0"/>
           </a:p>
         </p:txBody>
       </p:sp>
@@ -3789,7 +3776,7 @@
         </p:nvSpPr>
         <p:spPr>
           <a:xfrm>
-            <a:off x="3395402" y="2718262"/>
+            <a:off x="3395402" y="2718263"/>
             <a:ext cx="5401196" cy="590203"/>
           </a:xfrm>
         </p:spPr>
@@ -4011,23 +3998,14 @@
             </a:pPr>
             <a:r>
               <a:rPr lang="fr-FR" dirty="0"/>
-              <a:t>Oui </a:t>
-            </a:r>
-            <a:r>
-              <a:rPr lang="fr-FR" dirty="0" smtClean="0"/>
-              <a:t>[O]  /  </a:t>
-            </a:r>
-            <a:r>
-              <a:rPr lang="fr-FR" dirty="0"/>
-              <a:t>Non [N]</a:t>
+              <a:t>Oui [O]  /  Non [N]</a:t>
             </a:r>
           </a:p>
           <a:p>
             <a:pPr marL="0" indent="0">
-              <a:buFont typeface="Arial" panose="020B0604020202020204" pitchFamily="34" charset="0"/>
-              <a:buNone/>
-            </a:pPr>
-            <a:endParaRPr lang="fr-FR" dirty="0" smtClean="0"/>
+              <a:buNone/>
+            </a:pPr>
+            <a:endParaRPr lang="fr-FR" dirty="0"/>
           </a:p>
         </p:txBody>
       </p:sp>
@@ -4080,7 +4058,7 @@
         </p:nvSpPr>
         <p:spPr>
           <a:xfrm>
-            <a:off x="1992977" y="2766219"/>
+            <a:off x="1992978" y="2766220"/>
             <a:ext cx="8206047" cy="1325563"/>
           </a:xfrm>
         </p:spPr>
@@ -4113,7 +4091,7 @@
         </p:nvSpPr>
         <p:spPr>
           <a:xfrm>
-            <a:off x="4121485" y="6369919"/>
+            <a:off x="4121486" y="6369919"/>
             <a:ext cx="3949030" cy="400110"/>
           </a:xfrm>
           <a:prstGeom prst="rect">
@@ -4225,20 +4203,23 @@
               <a:buNone/>
             </a:pPr>
             <a:r>
-              <a:rPr lang="fr-FR" sz="2000" dirty="0" smtClean="0"/>
-              <a:t>A </a:t>
-            </a:r>
-            <a:r>
               <a:rPr lang="fr-FR" sz="2000" dirty="0"/>
-              <a:t>chaque essai de ce jeu, nous allons vous présenter plusieurs images de visages en même temps. </a:t>
-            </a:r>
-            <a:r>
-              <a:rPr lang="fr-FR" sz="2000" dirty="0" smtClean="0"/>
-              <a:t>Il </a:t>
-            </a:r>
+              <a:t>A chaque essai de ce jeu, nous allons vous présenter plusieurs images de visages en même temps. Il s’agit de visages d’hommes ou de femmes; certains auront une expression apeurée et d’autres auront une expression faciale neutre. </a:t>
+            </a:r>
+          </a:p>
+          <a:p>
+            <a:pPr marL="0" indent="0" algn="just">
+              <a:buNone/>
+            </a:pPr>
+            <a:endParaRPr lang="fr-FR" sz="2000" dirty="0"/>
+          </a:p>
+          <a:p>
+            <a:pPr marL="0" indent="0" algn="just">
+              <a:buNone/>
+            </a:pPr>
             <a:r>
               <a:rPr lang="fr-FR" sz="2000" dirty="0"/>
-              <a:t>s’agit de visages d’hommes ou de femmes; certains auront une expression apeurée et d’autres auront une expression faciale neutre. </a:t>
+              <a:t>Dans certains essais, nous vous demanderons si vous avez vu « plus d’hommes » ; dans les autres, nous vous demanderons si vous avez vu « plus de femmes ». </a:t>
             </a:r>
           </a:p>
           <a:p>
@@ -4252,8 +4233,8 @@
               <a:buNone/>
             </a:pPr>
             <a:r>
-              <a:rPr lang="fr-FR" sz="2000" dirty="0" smtClean="0"/>
-              <a:t>Dans certains essais, nous vous demanderons si vous avez vu « plus d’hommes » ; dans les autres, nous vous demanderons si vous avez vu « plus de femmes ». </a:t>
+              <a:rPr lang="fr-FR" sz="2000" dirty="0"/>
+              <a:t>Répondez par « Femmes » ou par « Hommes » aussi rapidement que possible, en appuyant sur les touches [F] ou [H] du clavier. </a:t>
             </a:r>
           </a:p>
           <a:p>
@@ -4267,22 +4248,7 @@
               <a:buNone/>
             </a:pPr>
             <a:r>
-              <a:rPr lang="fr-FR" sz="2000" dirty="0" smtClean="0"/>
-              <a:t>Répondez par « Femmes » ou par « Hommes » aussi rapidement que possible, en appuyant sur les touches [F] ou [H] du clavier. </a:t>
-            </a:r>
-          </a:p>
-          <a:p>
-            <a:pPr marL="0" indent="0" algn="just">
-              <a:buNone/>
-            </a:pPr>
-            <a:endParaRPr lang="fr-FR" sz="2000" dirty="0" smtClean="0"/>
-          </a:p>
-          <a:p>
-            <a:pPr marL="0" indent="0" algn="just">
-              <a:buNone/>
-            </a:pPr>
-            <a:r>
-              <a:rPr lang="fr-FR" sz="2000" dirty="0" smtClean="0"/>
+              <a:rPr lang="fr-FR" sz="2000" dirty="0"/>
               <a:t>Attention: vous ne pourrez pas modifier votre réponse!</a:t>
             </a:r>
           </a:p>
@@ -4299,7 +4265,7 @@
         </p:nvSpPr>
         <p:spPr>
           <a:xfrm>
-            <a:off x="4121485" y="6369919"/>
+            <a:off x="4121486" y="6369919"/>
             <a:ext cx="3949030" cy="400110"/>
           </a:xfrm>
           <a:prstGeom prst="rect">
@@ -4402,7 +4368,7 @@
         </p:nvSpPr>
         <p:spPr>
           <a:xfrm>
-            <a:off x="838199" y="1825625"/>
+            <a:off x="838200" y="1825625"/>
             <a:ext cx="10176165" cy="4351338"/>
           </a:xfrm>
         </p:spPr>
@@ -4419,23 +4385,19 @@
             <a:pPr marL="0" indent="0">
               <a:buNone/>
             </a:pPr>
-            <a:endParaRPr lang="fr-FR" sz="2000" dirty="0" smtClean="0"/>
+            <a:endParaRPr lang="fr-FR" sz="2000" dirty="0"/>
           </a:p>
           <a:p>
             <a:pPr marL="0" indent="0">
               <a:buNone/>
             </a:pPr>
             <a:r>
-              <a:rPr lang="fr-FR" sz="2000" dirty="0" smtClean="0"/>
-              <a:t>Vous </a:t>
-            </a:r>
-            <a:r>
               <a:rPr lang="fr-FR" sz="2000" dirty="0"/>
-              <a:t>allez maintenant avoir plusieurs essais d’entrainement. </a:t>
-            </a:r>
-          </a:p>
-          <a:p>
-            <a:endParaRPr lang="fr-FR" sz="2000" dirty="0" smtClean="0"/>
+              <a:t>Vous allez maintenant avoir plusieurs essais d’entrainement. </a:t>
+            </a:r>
+          </a:p>
+          <a:p>
+            <a:endParaRPr lang="fr-FR" sz="2000" dirty="0"/>
           </a:p>
           <a:p>
             <a:pPr marL="0" indent="0">
@@ -4448,44 +4410,8 @@
               <a:buNone/>
             </a:pPr>
             <a:r>
-              <a:rPr lang="fr-FR" sz="2000" dirty="0" smtClean="0"/>
-              <a:t>Rappelez-vous </a:t>
-            </a:r>
-            <a:r>
               <a:rPr lang="fr-FR" sz="2000" dirty="0"/>
-              <a:t>d’utiliser la touche </a:t>
-            </a:r>
-            <a:r>
-              <a:rPr lang="fr-FR" sz="2000" dirty="0" smtClean="0"/>
-              <a:t>[F] </a:t>
-            </a:r>
-            <a:r>
-              <a:rPr lang="fr-FR" sz="2000" dirty="0"/>
-              <a:t>pour répondre « </a:t>
-            </a:r>
-            <a:r>
-              <a:rPr lang="fr-FR" sz="2000" dirty="0" smtClean="0"/>
-              <a:t>Femmes </a:t>
-            </a:r>
-            <a:r>
-              <a:rPr lang="fr-FR" sz="2000" dirty="0"/>
-              <a:t>» et la touche </a:t>
-            </a:r>
-            <a:r>
-              <a:rPr lang="fr-FR" sz="2000" dirty="0" smtClean="0"/>
-              <a:t>[H] </a:t>
-            </a:r>
-            <a:r>
-              <a:rPr lang="fr-FR" sz="2000" dirty="0"/>
-              <a:t>pour répondre « </a:t>
-            </a:r>
-            <a:r>
-              <a:rPr lang="fr-FR" sz="2000" dirty="0" smtClean="0"/>
-              <a:t>Hommes </a:t>
-            </a:r>
-            <a:r>
-              <a:rPr lang="fr-FR" sz="2000" dirty="0"/>
-              <a:t>». </a:t>
+              <a:t>Rappelez-vous d’utiliser la touche [F] pour répondre « Femmes » et la touche [H] pour répondre « Hommes ». </a:t>
             </a:r>
           </a:p>
           <a:p>
@@ -4501,7 +4427,7 @@
         </p:nvSpPr>
         <p:spPr>
           <a:xfrm>
-            <a:off x="4121485" y="6369919"/>
+            <a:off x="4121486" y="6369919"/>
             <a:ext cx="3949030" cy="400110"/>
           </a:xfrm>
           <a:prstGeom prst="rect">
@@ -4604,7 +4530,7 @@
         </p:nvSpPr>
         <p:spPr>
           <a:xfrm>
-            <a:off x="838199" y="1825625"/>
+            <a:off x="838200" y="1825625"/>
             <a:ext cx="10608425" cy="4351338"/>
           </a:xfrm>
         </p:spPr>
@@ -4621,7 +4547,7 @@
             <a:pPr marL="0" indent="0">
               <a:buNone/>
             </a:pPr>
-            <a:endParaRPr lang="fr-FR" sz="2000" dirty="0" smtClean="0"/>
+            <a:endParaRPr lang="fr-FR" sz="2000" dirty="0"/>
           </a:p>
           <a:p>
             <a:pPr marL="0" indent="0">
@@ -4633,11 +4559,7 @@
             </a:r>
             <a:r>
               <a:rPr lang="fr-FR" sz="2000" i="1" dirty="0"/>
-              <a:t>jeu de </a:t>
-            </a:r>
-            <a:r>
-              <a:rPr lang="fr-FR" sz="2000" i="1" dirty="0" smtClean="0"/>
-              <a:t>mémoire </a:t>
+              <a:t>jeu de mémoire </a:t>
             </a:r>
             <a:r>
               <a:rPr lang="fr-FR" sz="2000" dirty="0"/>
@@ -4648,7 +4570,7 @@
             <a:pPr marL="0" indent="0">
               <a:buNone/>
             </a:pPr>
-            <a:endParaRPr lang="fr-FR" sz="2000" dirty="0" smtClean="0"/>
+            <a:endParaRPr lang="fr-FR" sz="2000" dirty="0"/>
           </a:p>
           <a:p>
             <a:pPr marL="0" indent="0">
@@ -4661,12 +4583,8 @@
               <a:buNone/>
             </a:pPr>
             <a:r>
-              <a:rPr lang="fr-FR" sz="2000" dirty="0" smtClean="0"/>
-              <a:t>Si </a:t>
-            </a:r>
-            <a:r>
               <a:rPr lang="fr-FR" sz="2000" dirty="0"/>
-              <a:t>vous avez des questions, demandez à l’expérimentatrice  s’il vous plait. </a:t>
+              <a:t>Si vous avez des questions, demandez à l’expérimentatrice  s’il vous plait. </a:t>
             </a:r>
           </a:p>
           <a:p>
@@ -4682,7 +4600,7 @@
         </p:nvSpPr>
         <p:spPr>
           <a:xfrm>
-            <a:off x="4121485" y="6369919"/>
+            <a:off x="4121486" y="6369919"/>
             <a:ext cx="3949030" cy="400110"/>
           </a:xfrm>
           <a:prstGeom prst="rect">
@@ -4806,19 +4724,19 @@
             <a:pPr marL="0" indent="0">
               <a:buNone/>
             </a:pPr>
-            <a:endParaRPr lang="fr-FR" sz="2000" dirty="0" smtClean="0"/>
+            <a:endParaRPr lang="fr-FR" sz="2000" dirty="0"/>
           </a:p>
           <a:p>
             <a:pPr marL="0" indent="0">
               <a:buNone/>
             </a:pPr>
             <a:r>
-              <a:rPr lang="fr-FR" sz="2000" dirty="0" smtClean="0"/>
+              <a:rPr lang="fr-FR" sz="2000" dirty="0"/>
               <a:t>Vous allez maintenant commencer le jeu. </a:t>
             </a:r>
           </a:p>
           <a:p>
-            <a:endParaRPr lang="fr-FR" sz="2000" dirty="0" smtClean="0"/>
+            <a:endParaRPr lang="fr-FR" sz="2000" dirty="0"/>
           </a:p>
           <a:p>
             <a:pPr marL="0" indent="0">
@@ -4831,7 +4749,7 @@
               <a:buNone/>
             </a:pPr>
             <a:r>
-              <a:rPr lang="fr-FR" sz="2000" dirty="0" smtClean="0"/>
+              <a:rPr lang="fr-FR" sz="2000" dirty="0"/>
               <a:t>Rappelez-vous d’utiliser la touche [F] pour répondre « Femmes » et la touche [H] pour répondre « Hommes ». </a:t>
             </a:r>
           </a:p>
@@ -4845,7 +4763,7 @@
         </p:nvSpPr>
         <p:spPr>
           <a:xfrm>
-            <a:off x="4121485" y="6369919"/>
+            <a:off x="4121486" y="6369919"/>
             <a:ext cx="3949030" cy="400110"/>
           </a:xfrm>
           <a:prstGeom prst="rect">
@@ -4921,7 +4839,7 @@
         </p:nvSpPr>
         <p:spPr>
           <a:xfrm>
-            <a:off x="2556683" y="2718262"/>
+            <a:off x="2556683" y="2718263"/>
             <a:ext cx="7078634" cy="482137"/>
           </a:xfrm>
         </p:spPr>
@@ -4962,7 +4880,7 @@
         </p:nvSpPr>
         <p:spPr>
           <a:xfrm>
-            <a:off x="3959629" y="3735187"/>
+            <a:off x="3959630" y="3735187"/>
             <a:ext cx="4272742" cy="520930"/>
           </a:xfrm>
           <a:prstGeom prst="rect">
@@ -5142,17 +5060,15 @@
               <a:buNone/>
             </a:pPr>
             <a:r>
-              <a:rPr lang="fr-FR" dirty="0" smtClean="0"/>
+              <a:rPr lang="fr-FR" dirty="0"/>
               <a:t>Femmes [F]  /  Hommes [H]</a:t>
             </a:r>
+          </a:p>
+          <a:p>
+            <a:pPr marL="0" indent="0">
+              <a:buNone/>
+            </a:pPr>
             <a:endParaRPr lang="fr-FR" dirty="0"/>
-          </a:p>
-          <a:p>
-            <a:pPr marL="0" indent="0">
-              <a:buFont typeface="Arial" panose="020B0604020202020204" pitchFamily="34" charset="0"/>
-              <a:buNone/>
-            </a:pPr>
-            <a:endParaRPr lang="fr-FR" dirty="0" smtClean="0"/>
           </a:p>
         </p:txBody>
       </p:sp>
@@ -5205,7 +5121,7 @@
         </p:nvSpPr>
         <p:spPr>
           <a:xfrm>
-            <a:off x="2591147" y="2766219"/>
+            <a:off x="2591147" y="2766220"/>
             <a:ext cx="7009707" cy="1325563"/>
           </a:xfrm>
         </p:spPr>
@@ -5238,7 +5154,7 @@
         </p:nvSpPr>
         <p:spPr>
           <a:xfrm>
-            <a:off x="4121485" y="6369919"/>
+            <a:off x="4121486" y="6369919"/>
             <a:ext cx="3949030" cy="400110"/>
           </a:xfrm>
           <a:prstGeom prst="rect">
@@ -5347,7 +5263,6 @@
               <a:rPr lang="fr-FR" sz="2000" dirty="0"/>
               <a:t>) qui durent environ 20 minutes chacun. </a:t>
             </a:r>
-            <a:endParaRPr lang="fr-FR" sz="2000" dirty="0" smtClean="0"/>
           </a:p>
           <a:p>
             <a:pPr marL="0" indent="0" algn="just">
@@ -5385,11 +5300,7 @@
             </a:r>
             <a:r>
               <a:rPr lang="fr-FR" sz="2000" dirty="0"/>
-              <a:t>. Nous vous indiquerons, à chaque essai, quelle est la récompense en jeu</a:t>
-            </a:r>
-            <a:r>
-              <a:rPr lang="fr-FR" sz="2000" dirty="0" smtClean="0"/>
-              <a:t>.</a:t>
+              <a:t>. Nous vous indiquerons, à chaque essai, quelle est la récompense en jeu.</a:t>
             </a:r>
           </a:p>
           <a:p>
@@ -5444,7 +5355,7 @@
         </p:nvSpPr>
         <p:spPr>
           <a:xfrm>
-            <a:off x="4121485" y="6369919"/>
+            <a:off x="4121486" y="6369919"/>
             <a:ext cx="3949030" cy="400110"/>
           </a:xfrm>
           <a:prstGeom prst="rect">
@@ -5569,8 +5480,8 @@
         </p:nvSpPr>
         <p:spPr>
           <a:xfrm>
-            <a:off x="4376459" y="6369919"/>
-            <a:ext cx="3439083" cy="400110"/>
+            <a:off x="4376460" y="6369919"/>
+            <a:ext cx="3381375" cy="400110"/>
           </a:xfrm>
           <a:prstGeom prst="rect">
             <a:avLst/>
@@ -5591,27 +5502,8 @@
                   </a:schemeClr>
                 </a:solidFill>
               </a:rPr>
-              <a:t>Appuyez sur [espace] pour </a:t>
-            </a:r>
-            <a:r>
-              <a:rPr lang="fr-FR" sz="2000" i="1" dirty="0" smtClean="0">
-                <a:solidFill>
-                  <a:schemeClr val="tx1">
-                    <a:lumMod val="50000"/>
-                    <a:lumOff val="50000"/>
-                  </a:schemeClr>
-                </a:solidFill>
-              </a:rPr>
-              <a:t>finir</a:t>
-            </a:r>
-            <a:endParaRPr lang="fr-FR" sz="2000" i="1" dirty="0">
-              <a:solidFill>
-                <a:schemeClr val="tx1">
-                  <a:lumMod val="50000"/>
-                  <a:lumOff val="50000"/>
-                </a:schemeClr>
-              </a:solidFill>
-            </a:endParaRPr>
+              <a:t>Appuyez sur [espace] pour finir</a:t>
+            </a:r>
           </a:p>
         </p:txBody>
       </p:sp>
@@ -5664,7 +5556,7 @@
         </p:nvSpPr>
         <p:spPr>
           <a:xfrm>
-            <a:off x="3502685" y="2202873"/>
+            <a:off x="3502686" y="2202873"/>
             <a:ext cx="5186631" cy="565265"/>
           </a:xfrm>
         </p:spPr>
@@ -5693,7 +5585,7 @@
         </p:nvSpPr>
         <p:spPr>
           <a:xfrm>
-            <a:off x="4121485" y="6369919"/>
+            <a:off x="4121486" y="6369919"/>
             <a:ext cx="3949030" cy="400110"/>
           </a:xfrm>
           <a:prstGeom prst="rect">
@@ -5799,7 +5691,7 @@
         </p:nvSpPr>
         <p:spPr>
           <a:xfrm>
-            <a:off x="3502685" y="2148842"/>
+            <a:off x="3502686" y="2148842"/>
             <a:ext cx="5186631" cy="477980"/>
           </a:xfrm>
         </p:spPr>
@@ -5836,7 +5728,7 @@
         </p:nvSpPr>
         <p:spPr>
           <a:xfrm>
-            <a:off x="4121485" y="6369919"/>
+            <a:off x="4121486" y="6369919"/>
             <a:ext cx="3949030" cy="400110"/>
           </a:xfrm>
           <a:prstGeom prst="rect">
@@ -5942,7 +5834,7 @@
         </p:nvSpPr>
         <p:spPr>
           <a:xfrm>
-            <a:off x="3502685" y="2148842"/>
+            <a:off x="3502686" y="2148842"/>
             <a:ext cx="5186631" cy="477980"/>
           </a:xfrm>
         </p:spPr>
@@ -5979,7 +5871,7 @@
         </p:nvSpPr>
         <p:spPr>
           <a:xfrm>
-            <a:off x="4121485" y="6369919"/>
+            <a:off x="4121486" y="6369919"/>
             <a:ext cx="3949030" cy="400110"/>
           </a:xfrm>
           <a:prstGeom prst="rect">
@@ -6058,7 +5950,7 @@
         </p:blipFill>
         <p:spPr>
           <a:xfrm>
-            <a:off x="5556000" y="3219596"/>
+            <a:off x="5556001" y="3219596"/>
             <a:ext cx="1087105" cy="1080000"/>
           </a:xfrm>
           <a:prstGeom prst="rect">
@@ -6154,7 +6046,7 @@
               <a:buNone/>
             </a:pPr>
             <a:r>
-              <a:rPr lang="fr-FR" sz="2000" dirty="0" smtClean="0"/>
+              <a:rPr lang="fr-FR" sz="2000" dirty="0"/>
               <a:t>A chaque essai de ce jeu, nous allons vous présenter une séquence d’images de visages très rapide. Certains de ces visages ont été brouillés pour vous distraire.</a:t>
             </a:r>
           </a:p>
@@ -6162,27 +6054,22 @@
             <a:pPr marL="0" indent="0" algn="just">
               <a:buNone/>
             </a:pPr>
-            <a:endParaRPr lang="fr-FR" sz="2000" dirty="0" smtClean="0"/>
+            <a:endParaRPr lang="fr-FR" sz="2000" dirty="0"/>
           </a:p>
           <a:p>
             <a:pPr marL="0" indent="0" algn="just">
               <a:buNone/>
             </a:pPr>
             <a:r>
-              <a:rPr lang="fr-FR" sz="2000" dirty="0" smtClean="0"/>
-              <a:t>Le jeu consiste à reconnaître le genre (homme ou femme) des visages intactes, c’est-à-dire non brouillés. Exemple</a:t>
-            </a:r>
-            <a:r>
-              <a:rPr lang="fr-FR" sz="2000" dirty="0" smtClean="0"/>
-              <a:t>: </a:t>
-            </a:r>
-            <a:endParaRPr lang="fr-FR" sz="2000" dirty="0" smtClean="0"/>
+              <a:rPr lang="fr-FR" sz="2000" dirty="0"/>
+              <a:t>Le jeu consiste à reconnaître le genre (homme ou femme) des visages intactes, c’est-à-dire non brouillés. Exemple: </a:t>
+            </a:r>
           </a:p>
           <a:p>
             <a:pPr marL="0" indent="0" algn="just">
               <a:buNone/>
             </a:pPr>
-            <a:endParaRPr lang="fr-FR" sz="2000" dirty="0" smtClean="0"/>
+            <a:endParaRPr lang="fr-FR" sz="2000" dirty="0"/>
           </a:p>
           <a:p>
             <a:endParaRPr lang="fr-FR" dirty="0"/>
@@ -6197,7 +6084,7 @@
         </p:nvSpPr>
         <p:spPr>
           <a:xfrm>
-            <a:off x="4121485" y="6369919"/>
+            <a:off x="4121486" y="6369919"/>
             <a:ext cx="3949030" cy="400110"/>
           </a:xfrm>
           <a:prstGeom prst="rect">
@@ -6239,7 +6126,7 @@
         </p:blipFill>
         <p:spPr>
           <a:xfrm>
-            <a:off x="7365076" y="4330931"/>
+            <a:off x="7365077" y="4330931"/>
             <a:ext cx="1875349" cy="1800000"/>
           </a:xfrm>
           <a:prstGeom prst="rect">
@@ -6262,7 +6149,7 @@
         </p:blipFill>
         <p:spPr>
           <a:xfrm>
-            <a:off x="3050771" y="4322618"/>
+            <a:off x="3050772" y="4322618"/>
             <a:ext cx="1791548" cy="1800000"/>
           </a:xfrm>
           <a:prstGeom prst="rect">
@@ -6457,27 +6344,24 @@
           </a:lstStyle>
           <a:p>
             <a:pPr marL="0" indent="0" algn="just">
-              <a:buFont typeface="Arial" panose="020B0604020202020204" pitchFamily="34" charset="0"/>
-              <a:buNone/>
-            </a:pPr>
-            <a:r>
-              <a:rPr lang="fr-FR" sz="2000" dirty="0" smtClean="0"/>
+              <a:buNone/>
+            </a:pPr>
+            <a:r>
+              <a:rPr lang="fr-FR" sz="2000" dirty="0"/>
               <a:t>Visage brouillé</a:t>
             </a:r>
           </a:p>
           <a:p>
             <a:pPr marL="0" indent="0" algn="just">
-              <a:buFont typeface="Arial" panose="020B0604020202020204" pitchFamily="34" charset="0"/>
-              <a:buNone/>
-            </a:pPr>
-            <a:endParaRPr lang="fr-FR" sz="2000" dirty="0" smtClean="0"/>
+              <a:buNone/>
+            </a:pPr>
+            <a:endParaRPr lang="fr-FR" sz="2000" dirty="0"/>
           </a:p>
           <a:p>
             <a:pPr marL="0" indent="0" algn="just">
-              <a:buFont typeface="Arial" panose="020B0604020202020204" pitchFamily="34" charset="0"/>
-              <a:buNone/>
-            </a:pPr>
-            <a:endParaRPr lang="fr-FR" sz="2000" dirty="0" smtClean="0"/>
+              <a:buNone/>
+            </a:pPr>
+            <a:endParaRPr lang="fr-FR" sz="2000" dirty="0"/>
           </a:p>
           <a:p>
             <a:endParaRPr lang="fr-FR" dirty="0"/>
@@ -6671,27 +6555,24 @@
           </a:lstStyle>
           <a:p>
             <a:pPr marL="0" indent="0" algn="just">
-              <a:buFont typeface="Arial" panose="020B0604020202020204" pitchFamily="34" charset="0"/>
-              <a:buNone/>
-            </a:pPr>
-            <a:r>
-              <a:rPr lang="fr-FR" sz="2000" dirty="0" smtClean="0"/>
+              <a:buNone/>
+            </a:pPr>
+            <a:r>
+              <a:rPr lang="fr-FR" sz="2000" dirty="0"/>
               <a:t>Visage intact </a:t>
             </a:r>
           </a:p>
           <a:p>
             <a:pPr marL="0" indent="0" algn="just">
-              <a:buFont typeface="Arial" panose="020B0604020202020204" pitchFamily="34" charset="0"/>
-              <a:buNone/>
-            </a:pPr>
-            <a:endParaRPr lang="fr-FR" sz="2000" dirty="0" smtClean="0"/>
+              <a:buNone/>
+            </a:pPr>
+            <a:endParaRPr lang="fr-FR" sz="2000" dirty="0"/>
           </a:p>
           <a:p>
             <a:pPr marL="0" indent="0" algn="just">
-              <a:buFont typeface="Arial" panose="020B0604020202020204" pitchFamily="34" charset="0"/>
-              <a:buNone/>
-            </a:pPr>
-            <a:endParaRPr lang="fr-FR" sz="2000" dirty="0" smtClean="0"/>
+              <a:buNone/>
+            </a:pPr>
+            <a:endParaRPr lang="fr-FR" sz="2000" dirty="0"/>
           </a:p>
           <a:p>
             <a:endParaRPr lang="fr-FR" dirty="0"/>
@@ -6780,14 +6661,14 @@
             <a:pPr marL="0" indent="0" algn="just">
               <a:buNone/>
             </a:pPr>
-            <a:endParaRPr lang="fr-FR" sz="2000" dirty="0" smtClean="0"/>
+            <a:endParaRPr lang="fr-FR" sz="2000" dirty="0"/>
           </a:p>
           <a:p>
             <a:pPr marL="0" indent="0" algn="just">
               <a:buNone/>
             </a:pPr>
             <a:r>
-              <a:rPr lang="fr-FR" sz="2000" dirty="0" smtClean="0"/>
+              <a:rPr lang="fr-FR" sz="2000" dirty="0"/>
               <a:t>Dans certains essais, nous vous demanderons si vous avez vu "au moins un homme" ; dans les autres, nous vous demanderons si vous avez vu "au moins une femme". </a:t>
             </a:r>
           </a:p>
@@ -6802,7 +6683,7 @@
               <a:buNone/>
             </a:pPr>
             <a:r>
-              <a:rPr lang="fr-FR" sz="2000" dirty="0" smtClean="0"/>
+              <a:rPr lang="fr-FR" sz="2000" dirty="0"/>
               <a:t>Répondez par « Oui » ou par « Non » aussi rapidement que possible, en appuyant sur les touches [O] ou [N] du clavier. </a:t>
             </a:r>
           </a:p>
@@ -6810,14 +6691,14 @@
             <a:pPr marL="0" indent="0" algn="just">
               <a:buNone/>
             </a:pPr>
-            <a:endParaRPr lang="fr-FR" sz="2000" dirty="0" smtClean="0"/>
+            <a:endParaRPr lang="fr-FR" sz="2000" dirty="0"/>
           </a:p>
           <a:p>
             <a:pPr marL="0" indent="0" algn="just">
               <a:buNone/>
             </a:pPr>
             <a:r>
-              <a:rPr lang="fr-FR" sz="2000" dirty="0" smtClean="0"/>
+              <a:rPr lang="fr-FR" sz="2000" dirty="0"/>
               <a:t>Attention: vous ne pourrez pas modifier votre réponse!</a:t>
             </a:r>
           </a:p>
@@ -6834,7 +6715,7 @@
         </p:nvSpPr>
         <p:spPr>
           <a:xfrm>
-            <a:off x="4121485" y="6369919"/>
+            <a:off x="4121486" y="6369919"/>
             <a:ext cx="3949030" cy="400110"/>
           </a:xfrm>
           <a:prstGeom prst="rect">
@@ -6937,7 +6818,7 @@
         </p:nvSpPr>
         <p:spPr>
           <a:xfrm>
-            <a:off x="838199" y="1825625"/>
+            <a:off x="838200" y="1825625"/>
             <a:ext cx="10608425" cy="4351338"/>
           </a:xfrm>
         </p:spPr>
@@ -6954,23 +6835,19 @@
             <a:pPr marL="0" indent="0">
               <a:buNone/>
             </a:pPr>
-            <a:endParaRPr lang="fr-FR" sz="2000" dirty="0" smtClean="0"/>
+            <a:endParaRPr lang="fr-FR" sz="2000" dirty="0"/>
           </a:p>
           <a:p>
             <a:pPr marL="0" indent="0">
               <a:buNone/>
             </a:pPr>
             <a:r>
-              <a:rPr lang="fr-FR" sz="2000" dirty="0" smtClean="0"/>
-              <a:t>Vous </a:t>
-            </a:r>
-            <a:r>
               <a:rPr lang="fr-FR" sz="2000" dirty="0"/>
-              <a:t>allez maintenant avoir plusieurs essais d’entrainement. </a:t>
-            </a:r>
-          </a:p>
-          <a:p>
-            <a:endParaRPr lang="fr-FR" sz="2000" dirty="0" smtClean="0"/>
+              <a:t>Vous allez maintenant avoir plusieurs essais d’entrainement. </a:t>
+            </a:r>
+          </a:p>
+          <a:p>
+            <a:endParaRPr lang="fr-FR" sz="2000" dirty="0"/>
           </a:p>
           <a:p>
             <a:pPr marL="0" indent="0">
@@ -6983,12 +6860,8 @@
               <a:buNone/>
             </a:pPr>
             <a:r>
-              <a:rPr lang="fr-FR" sz="2000" dirty="0" smtClean="0"/>
-              <a:t>Rappelez-vous </a:t>
-            </a:r>
-            <a:r>
               <a:rPr lang="fr-FR" sz="2000" dirty="0"/>
-              <a:t>d’utiliser la touche [O] pour répondre « Oui » et la touche [N] pour répondre « Non ». </a:t>
+              <a:t>Rappelez-vous d’utiliser la touche [O] pour répondre « Oui » et la touche [N] pour répondre « Non ». </a:t>
             </a:r>
           </a:p>
           <a:p>
@@ -7004,7 +6877,7 @@
         </p:nvSpPr>
         <p:spPr>
           <a:xfrm>
-            <a:off x="4121485" y="6369919"/>
+            <a:off x="4121486" y="6369919"/>
             <a:ext cx="3949030" cy="400110"/>
           </a:xfrm>
           <a:prstGeom prst="rect">
@@ -7107,7 +6980,7 @@
         </p:nvSpPr>
         <p:spPr>
           <a:xfrm>
-            <a:off x="838199" y="1825625"/>
+            <a:off x="838200" y="1825625"/>
             <a:ext cx="10608425" cy="4351338"/>
           </a:xfrm>
         </p:spPr>
@@ -7124,7 +6997,7 @@
             <a:pPr marL="0" indent="0">
               <a:buNone/>
             </a:pPr>
-            <a:endParaRPr lang="fr-FR" sz="2000" dirty="0" smtClean="0"/>
+            <a:endParaRPr lang="fr-FR" sz="2000" dirty="0"/>
           </a:p>
           <a:p>
             <a:pPr marL="0" indent="0">
@@ -7139,7 +7012,7 @@
             <a:pPr marL="0" indent="0">
               <a:buNone/>
             </a:pPr>
-            <a:endParaRPr lang="fr-FR" sz="2000" dirty="0" smtClean="0"/>
+            <a:endParaRPr lang="fr-FR" sz="2000" dirty="0"/>
           </a:p>
           <a:p>
             <a:pPr marL="0" indent="0">
@@ -7152,12 +7025,8 @@
               <a:buNone/>
             </a:pPr>
             <a:r>
-              <a:rPr lang="fr-FR" sz="2000" dirty="0" smtClean="0"/>
-              <a:t>Si </a:t>
-            </a:r>
-            <a:r>
               <a:rPr lang="fr-FR" sz="2000" dirty="0"/>
-              <a:t>vous avez des questions, demandez à l’expérimentatrice  s’il vous plait. </a:t>
+              <a:t>Si vous avez des questions, demandez à l’expérimentatrice  s’il vous plait. </a:t>
             </a:r>
           </a:p>
           <a:p>
@@ -7173,7 +7042,7 @@
         </p:nvSpPr>
         <p:spPr>
           <a:xfrm>
-            <a:off x="4121485" y="6369919"/>
+            <a:off x="4121486" y="6369919"/>
             <a:ext cx="3949030" cy="400110"/>
           </a:xfrm>
           <a:prstGeom prst="rect">

</xml_diff>

<commit_message>
new fct to avoid face repetition
</commit_message>
<xml_diff>
--- a/instructions/instructionsDiapo.pptx
+++ b/instructions/instructionsDiapo.pptx
@@ -262,7 +262,7 @@
           <a:p>
             <a:fld id="{712DDF4E-9AD6-4EE5-9343-468C572CABA6}" type="datetimeFigureOut">
               <a:rPr lang="fr-FR" smtClean="0"/>
-              <a:t>09/03/2020</a:t>
+              <a:t>11/03/2020</a:t>
             </a:fld>
             <a:endParaRPr lang="fr-FR" dirty="0"/>
           </a:p>
@@ -430,7 +430,7 @@
           <a:p>
             <a:fld id="{712DDF4E-9AD6-4EE5-9343-468C572CABA6}" type="datetimeFigureOut">
               <a:rPr lang="fr-FR" smtClean="0"/>
-              <a:t>09/03/2020</a:t>
+              <a:t>11/03/2020</a:t>
             </a:fld>
             <a:endParaRPr lang="fr-FR" dirty="0"/>
           </a:p>
@@ -608,7 +608,7 @@
           <a:p>
             <a:fld id="{712DDF4E-9AD6-4EE5-9343-468C572CABA6}" type="datetimeFigureOut">
               <a:rPr lang="fr-FR" smtClean="0"/>
-              <a:t>09/03/2020</a:t>
+              <a:t>11/03/2020</a:t>
             </a:fld>
             <a:endParaRPr lang="fr-FR" dirty="0"/>
           </a:p>
@@ -776,7 +776,7 @@
           <a:p>
             <a:fld id="{712DDF4E-9AD6-4EE5-9343-468C572CABA6}" type="datetimeFigureOut">
               <a:rPr lang="fr-FR" smtClean="0"/>
-              <a:t>09/03/2020</a:t>
+              <a:t>11/03/2020</a:t>
             </a:fld>
             <a:endParaRPr lang="fr-FR" dirty="0"/>
           </a:p>
@@ -1021,7 +1021,7 @@
           <a:p>
             <a:fld id="{712DDF4E-9AD6-4EE5-9343-468C572CABA6}" type="datetimeFigureOut">
               <a:rPr lang="fr-FR" smtClean="0"/>
-              <a:t>09/03/2020</a:t>
+              <a:t>11/03/2020</a:t>
             </a:fld>
             <a:endParaRPr lang="fr-FR" dirty="0"/>
           </a:p>
@@ -1250,7 +1250,7 @@
           <a:p>
             <a:fld id="{712DDF4E-9AD6-4EE5-9343-468C572CABA6}" type="datetimeFigureOut">
               <a:rPr lang="fr-FR" smtClean="0"/>
-              <a:t>09/03/2020</a:t>
+              <a:t>11/03/2020</a:t>
             </a:fld>
             <a:endParaRPr lang="fr-FR" dirty="0"/>
           </a:p>
@@ -1614,7 +1614,7 @@
           <a:p>
             <a:fld id="{712DDF4E-9AD6-4EE5-9343-468C572CABA6}" type="datetimeFigureOut">
               <a:rPr lang="fr-FR" smtClean="0"/>
-              <a:t>09/03/2020</a:t>
+              <a:t>11/03/2020</a:t>
             </a:fld>
             <a:endParaRPr lang="fr-FR" dirty="0"/>
           </a:p>
@@ -1731,7 +1731,7 @@
           <a:p>
             <a:fld id="{712DDF4E-9AD6-4EE5-9343-468C572CABA6}" type="datetimeFigureOut">
               <a:rPr lang="fr-FR" smtClean="0"/>
-              <a:t>09/03/2020</a:t>
+              <a:t>11/03/2020</a:t>
             </a:fld>
             <a:endParaRPr lang="fr-FR" dirty="0"/>
           </a:p>
@@ -1826,7 +1826,7 @@
           <a:p>
             <a:fld id="{712DDF4E-9AD6-4EE5-9343-468C572CABA6}" type="datetimeFigureOut">
               <a:rPr lang="fr-FR" smtClean="0"/>
-              <a:t>09/03/2020</a:t>
+              <a:t>11/03/2020</a:t>
             </a:fld>
             <a:endParaRPr lang="fr-FR" dirty="0"/>
           </a:p>
@@ -2101,7 +2101,7 @@
           <a:p>
             <a:fld id="{712DDF4E-9AD6-4EE5-9343-468C572CABA6}" type="datetimeFigureOut">
               <a:rPr lang="fr-FR" smtClean="0"/>
-              <a:t>09/03/2020</a:t>
+              <a:t>11/03/2020</a:t>
             </a:fld>
             <a:endParaRPr lang="fr-FR" dirty="0"/>
           </a:p>
@@ -2353,7 +2353,7 @@
           <a:p>
             <a:fld id="{712DDF4E-9AD6-4EE5-9343-468C572CABA6}" type="datetimeFigureOut">
               <a:rPr lang="fr-FR" smtClean="0"/>
-              <a:t>09/03/2020</a:t>
+              <a:t>11/03/2020</a:t>
             </a:fld>
             <a:endParaRPr lang="fr-FR" dirty="0"/>
           </a:p>
@@ -2564,7 +2564,7 @@
           <a:p>
             <a:fld id="{712DDF4E-9AD6-4EE5-9343-468C572CABA6}" type="datetimeFigureOut">
               <a:rPr lang="fr-FR" smtClean="0"/>
-              <a:t>09/03/2020</a:t>
+              <a:t>11/03/2020</a:t>
             </a:fld>
             <a:endParaRPr lang="fr-FR" dirty="0"/>
           </a:p>
@@ -3501,11 +3501,7 @@
             </a:r>
             <a:r>
               <a:rPr lang="fr-FR" i="1" dirty="0"/>
-              <a:t>jeu de </a:t>
-            </a:r>
-            <a:r>
-              <a:rPr lang="fr-FR" i="1" dirty="0"/>
-              <a:t>détection</a:t>
+              <a:t>jeu de détection</a:t>
             </a:r>
             <a:endParaRPr lang="fr-FR" dirty="0"/>
           </a:p>
@@ -3552,11 +3548,7 @@
             </a:r>
             <a:r>
               <a:rPr lang="fr-FR" sz="2000" i="1" dirty="0"/>
-              <a:t>jeu de </a:t>
-            </a:r>
-            <a:r>
-              <a:rPr lang="fr-FR" sz="2000" i="1" dirty="0"/>
-              <a:t>détection</a:t>
+              <a:t>jeu de détection</a:t>
             </a:r>
             <a:r>
               <a:rPr lang="fr-FR" sz="2000" i="1" dirty="0" smtClean="0"/>
@@ -3683,11 +3675,7 @@
             </a:r>
             <a:r>
               <a:rPr lang="fr-FR" i="1" dirty="0"/>
-              <a:t>jeu de </a:t>
-            </a:r>
-            <a:r>
-              <a:rPr lang="fr-FR" i="1" dirty="0"/>
-              <a:t>détection</a:t>
+              <a:t>jeu de détection</a:t>
             </a:r>
             <a:endParaRPr lang="fr-FR" dirty="0"/>
           </a:p>
@@ -4421,11 +4409,7 @@
             </a:r>
             <a:r>
               <a:rPr lang="fr-FR" i="1" dirty="0"/>
-              <a:t>jeu de </a:t>
-            </a:r>
-            <a:r>
-              <a:rPr lang="fr-FR" i="1" dirty="0"/>
-              <a:t>détection </a:t>
+              <a:t>jeu de détection </a:t>
             </a:r>
             <a:r>
               <a:rPr lang="fr-FR" dirty="0"/>
@@ -4570,37 +4554,44 @@
             <a:endParaRPr lang="fr-FR" sz="2000" dirty="0"/>
           </a:p>
           <a:p>
+            <a:pPr marL="0" indent="0">
+              <a:buNone/>
+            </a:pPr>
+            <a:r>
+              <a:rPr lang="fr-FR" sz="2000" dirty="0"/>
+              <a:t>Après avoir caché les images, nous vous demanderons de nous indiquer quel était le genre le plus représenté avec la question « Avez-vous vu </a:t>
+            </a:r>
+            <a:r>
+              <a:rPr lang="fr-FR" sz="2000" b="1" dirty="0"/>
+              <a:t>plus de femmes ou d’hommes</a:t>
+            </a:r>
+            <a:r>
+              <a:rPr lang="fr-FR" sz="2000" dirty="0"/>
+              <a:t>? </a:t>
+            </a:r>
+            <a:r>
+              <a:rPr lang="fr-FR" sz="2000"/>
+              <a:t>». </a:t>
+            </a:r>
+            <a:endParaRPr lang="fr-FR" sz="2000" smtClean="0"/>
+          </a:p>
+          <a:p>
+            <a:pPr marL="0" indent="0">
+              <a:buNone/>
+            </a:pPr>
+            <a:endParaRPr lang="fr-FR" sz="2000" dirty="0"/>
+          </a:p>
+          <a:p>
             <a:pPr marL="0" indent="0" algn="just">
               <a:buNone/>
             </a:pPr>
             <a:r>
+              <a:rPr lang="fr-FR" sz="2000" dirty="0" smtClean="0"/>
+              <a:t>Répondez </a:t>
+            </a:r>
+            <a:r>
               <a:rPr lang="fr-FR" sz="2000" dirty="0"/>
-              <a:t>Après avoir caché les images, nous vous demanderons de nous indiquer quel était le genre le plus représenté. Par exemple, dans certains essais, nous vous demanderons si vous avez vu « </a:t>
-            </a:r>
-            <a:r>
-              <a:rPr lang="fr-FR" sz="2000" b="1" dirty="0"/>
-              <a:t>plus d’hommes</a:t>
-            </a:r>
-            <a:r>
-              <a:rPr lang="fr-FR" sz="2000" dirty="0"/>
-              <a:t> » ; dans les autres, nous vous demanderons si vous avez vu « </a:t>
-            </a:r>
-            <a:r>
-              <a:rPr lang="fr-FR" sz="2000" b="1" dirty="0"/>
-              <a:t>plus de femmes</a:t>
-            </a:r>
-            <a:r>
-              <a:rPr lang="fr-FR" sz="2000" dirty="0"/>
-              <a:t> ». </a:t>
-            </a:r>
-          </a:p>
-          <a:p>
-            <a:pPr marL="0" indent="0" algn="just">
-              <a:buNone/>
-            </a:pPr>
-            <a:r>
-              <a:rPr lang="fr-FR" sz="2000" dirty="0"/>
-              <a:t>Répondez par « </a:t>
+              <a:t>par « </a:t>
             </a:r>
             <a:r>
               <a:rPr lang="fr-FR" sz="2000" b="1" dirty="0"/>
@@ -4651,7 +4642,23 @@
                   <a:srgbClr val="38BA40"/>
                 </a:solidFill>
               </a:rPr>
-              <a:t>cela vous aidera a trouver la bonne réponse</a:t>
+              <a:t>cela vous aidera </a:t>
+            </a:r>
+            <a:r>
+              <a:rPr lang="fr-FR" sz="2000" dirty="0" smtClean="0">
+                <a:solidFill>
+                  <a:srgbClr val="38BA40"/>
+                </a:solidFill>
+              </a:rPr>
+              <a:t>à </a:t>
+            </a:r>
+            <a:r>
+              <a:rPr lang="fr-FR" sz="2000" dirty="0">
+                <a:solidFill>
+                  <a:srgbClr val="38BA40"/>
+                </a:solidFill>
+              </a:rPr>
+              <a:t>trouver la bonne réponse</a:t>
             </a:r>
             <a:r>
               <a:rPr lang="fr-FR" sz="2000" dirty="0"/>
@@ -4763,11 +4770,7 @@
             </a:r>
             <a:r>
               <a:rPr lang="fr-FR" i="1" dirty="0"/>
-              <a:t>jeu de </a:t>
-            </a:r>
-            <a:r>
-              <a:rPr lang="fr-FR" i="1" dirty="0"/>
-              <a:t>reconnaissance</a:t>
+              <a:t>jeu de reconnaissance</a:t>
             </a:r>
             <a:endParaRPr lang="fr-FR" dirty="0"/>
           </a:p>
@@ -4812,8 +4815,33 @@
               <a:rPr lang="fr-FR" sz="2000" dirty="0"/>
               <a:t>Vous allez maintenant avoir plusieurs essais d’entrainement. </a:t>
             </a:r>
-          </a:p>
-          <a:p>
+            <a:endParaRPr lang="fr-FR" sz="2000" dirty="0" smtClean="0"/>
+          </a:p>
+          <a:p>
+            <a:pPr marL="0" indent="0">
+              <a:buNone/>
+            </a:pPr>
+            <a:endParaRPr lang="fr-FR" sz="2000" dirty="0" smtClean="0"/>
+          </a:p>
+          <a:p>
+            <a:pPr marL="0" indent="0">
+              <a:buNone/>
+            </a:pPr>
+            <a:endParaRPr lang="fr-FR" sz="2000" dirty="0"/>
+          </a:p>
+          <a:p>
+            <a:pPr marL="0" indent="0">
+              <a:buNone/>
+            </a:pPr>
+            <a:r>
+              <a:rPr lang="fr-FR" sz="2000" dirty="0"/>
+              <a:t>Votre performance dans cette phase ne sera pas prise en compte pour votre bonus financier.</a:t>
+            </a:r>
+          </a:p>
+          <a:p>
+            <a:pPr marL="0" indent="0">
+              <a:buNone/>
+            </a:pPr>
             <a:endParaRPr lang="fr-FR" sz="2000" dirty="0"/>
           </a:p>
           <a:p>
@@ -4922,11 +4950,7 @@
             </a:r>
             <a:r>
               <a:rPr lang="fr-FR" i="1" dirty="0"/>
-              <a:t>jeu de </a:t>
-            </a:r>
-            <a:r>
-              <a:rPr lang="fr-FR" i="1" dirty="0"/>
-              <a:t>reconnaissance</a:t>
+              <a:t>jeu de reconnaissance</a:t>
             </a:r>
             <a:endParaRPr lang="fr-FR" dirty="0"/>
           </a:p>
@@ -4973,11 +4997,7 @@
             </a:r>
             <a:r>
               <a:rPr lang="fr-FR" sz="2000" i="1" dirty="0"/>
-              <a:t>jeu de </a:t>
-            </a:r>
-            <a:r>
-              <a:rPr lang="fr-FR" sz="2000" i="1" dirty="0"/>
-              <a:t>reconnaissance </a:t>
+              <a:t>jeu de reconnaissance </a:t>
             </a:r>
             <a:r>
               <a:rPr lang="fr-FR" sz="2000" dirty="0"/>
@@ -5100,11 +5120,7 @@
             </a:r>
             <a:r>
               <a:rPr lang="fr-FR" i="1" dirty="0"/>
-              <a:t>jeu de </a:t>
-            </a:r>
-            <a:r>
-              <a:rPr lang="fr-FR" i="1" dirty="0"/>
-              <a:t>reconnaissance</a:t>
+              <a:t>jeu de reconnaissance</a:t>
             </a:r>
             <a:endParaRPr lang="fr-FR" dirty="0"/>
           </a:p>
@@ -5282,11 +5298,7 @@
             </a:r>
             <a:r>
               <a:rPr lang="fr-FR" sz="2000" i="1" dirty="0"/>
-              <a:t>jeu de </a:t>
-            </a:r>
-            <a:r>
-              <a:rPr lang="fr-FR" sz="2000" i="1" dirty="0"/>
-              <a:t>reconnaissance</a:t>
+              <a:t>jeu de reconnaissance</a:t>
             </a:r>
             <a:r>
               <a:rPr lang="fr-FR" sz="2000" dirty="0" smtClean="0"/>
@@ -5480,7 +5492,23 @@
             </a:pPr>
             <a:r>
               <a:rPr lang="fr-FR" dirty="0"/>
-              <a:t>Avez-vous vu plus de Femmes ou d’Hommes?</a:t>
+              <a:t>Avez-vous vu plus de </a:t>
+            </a:r>
+            <a:r>
+              <a:rPr lang="fr-FR" dirty="0" smtClean="0"/>
+              <a:t>femmes </a:t>
+            </a:r>
+            <a:r>
+              <a:rPr lang="fr-FR" dirty="0"/>
+              <a:t>ou </a:t>
+            </a:r>
+            <a:r>
+              <a:rPr lang="fr-FR" dirty="0" smtClean="0"/>
+              <a:t>d’hommes</a:t>
+            </a:r>
+            <a:r>
+              <a:rPr lang="fr-FR" dirty="0"/>
+              <a:t>?</a:t>
             </a:r>
           </a:p>
           <a:p>
@@ -5750,11 +5778,7 @@
             </a:r>
             <a:r>
               <a:rPr lang="fr-FR" i="1" dirty="0"/>
-              <a:t>jeu de </a:t>
-            </a:r>
-            <a:r>
-              <a:rPr lang="fr-FR" i="1" dirty="0"/>
-              <a:t>reconnaissance </a:t>
+              <a:t>jeu de reconnaissance </a:t>
             </a:r>
             <a:r>
               <a:rPr lang="fr-FR" dirty="0"/>
@@ -6020,19 +6044,7 @@
             </a:r>
             <a:r>
               <a:rPr lang="fr-FR" sz="2000" dirty="0" smtClean="0"/>
-              <a:t>. </a:t>
-            </a:r>
-            <a:r>
-              <a:rPr lang="fr-FR" sz="2000" dirty="0" smtClean="0"/>
-              <a:t>Exemple</a:t>
-            </a:r>
-            <a:r>
-              <a:rPr lang="fr-FR" sz="2000" dirty="0" smtClean="0"/>
-              <a:t>: </a:t>
-            </a:r>
-            <a:r>
-              <a:rPr lang="fr-FR" sz="2000" dirty="0" smtClean="0"/>
-              <a:t> </a:t>
+              <a:t>. Exemple:  </a:t>
             </a:r>
             <a:endParaRPr lang="fr-FR" sz="2000" dirty="0"/>
           </a:p>
@@ -7870,23 +7882,59 @@
             </a:pPr>
             <a:r>
               <a:rPr lang="fr-FR" sz="2000" dirty="0"/>
-              <a:t>Dans certains essais, nous vous demanderons si vous avez vu "</a:t>
+              <a:t>Dans certains essais, nous vous demanderons si vous avez vu </a:t>
+            </a:r>
+            <a:r>
+              <a:rPr lang="fr-FR" sz="2000" dirty="0" smtClean="0"/>
+              <a:t>« </a:t>
+            </a:r>
+            <a:r>
+              <a:rPr lang="fr-FR" sz="2000" b="1" dirty="0" smtClean="0"/>
+              <a:t>au </a:t>
             </a:r>
             <a:r>
               <a:rPr lang="fr-FR" sz="2000" b="1" dirty="0"/>
-              <a:t>au moins un homme</a:t>
+              <a:t>moins un </a:t>
+            </a:r>
+            <a:r>
+              <a:rPr lang="fr-FR" sz="2000" b="1" dirty="0" smtClean="0"/>
+              <a:t>homme</a:t>
+            </a:r>
+            <a:r>
+              <a:rPr lang="fr-FR" sz="2000" dirty="0" smtClean="0"/>
+              <a:t> »</a:t>
+            </a:r>
+            <a:r>
+              <a:rPr lang="fr-FR" sz="2000" dirty="0" smtClean="0"/>
+              <a:t> </a:t>
             </a:r>
             <a:r>
               <a:rPr lang="fr-FR" sz="2000" dirty="0"/>
-              <a:t>" ; dans les autres, nous vous demanderons si vous avez vu "</a:t>
+              <a:t>; dans les autres, nous vous demanderons si vous avez vu </a:t>
+            </a:r>
+            <a:r>
+              <a:rPr lang="fr-FR" sz="2000" dirty="0" smtClean="0"/>
+              <a:t>« </a:t>
+            </a:r>
+            <a:r>
+              <a:rPr lang="fr-FR" sz="2000" b="1" dirty="0" smtClean="0"/>
+              <a:t>au </a:t>
             </a:r>
             <a:r>
               <a:rPr lang="fr-FR" sz="2000" b="1" dirty="0"/>
-              <a:t>au moins une femme</a:t>
-            </a:r>
-            <a:r>
-              <a:rPr lang="fr-FR" sz="2000" dirty="0"/>
-              <a:t>". </a:t>
+              <a:t>moins une </a:t>
+            </a:r>
+            <a:r>
+              <a:rPr lang="fr-FR" sz="2000" b="1" dirty="0" smtClean="0"/>
+              <a:t>femme</a:t>
+            </a:r>
+            <a:r>
+              <a:rPr lang="fr-FR" sz="2000" dirty="0" smtClean="0"/>
+              <a:t> »</a:t>
+            </a:r>
+            <a:r>
+              <a:rPr lang="fr-FR" sz="2000" dirty="0" smtClean="0"/>
+              <a:t>. </a:t>
             </a:r>
             <a:endParaRPr lang="fr-FR" sz="2000" dirty="0" smtClean="0"/>
           </a:p>
@@ -7918,7 +7966,23 @@
             </a:r>
             <a:r>
               <a:rPr lang="fr-FR" sz="2000" dirty="0"/>
-              <a:t> » aussi rapidement que possible, en appuyant sur les touches [O] ou [N] du clavier. Vous ne pourrez pas modifier votre réponse!</a:t>
+              <a:t> » aussi rapidement que possible, en appuyant sur les touches [</a:t>
+            </a:r>
+            <a:r>
+              <a:rPr lang="fr-FR" sz="2000" b="1" dirty="0"/>
+              <a:t>O</a:t>
+            </a:r>
+            <a:r>
+              <a:rPr lang="fr-FR" sz="2000" dirty="0"/>
+              <a:t>] ou [</a:t>
+            </a:r>
+            <a:r>
+              <a:rPr lang="fr-FR" sz="2000" b="1" dirty="0"/>
+              <a:t>N</a:t>
+            </a:r>
+            <a:r>
+              <a:rPr lang="fr-FR" sz="2000" dirty="0"/>
+              <a:t>] du clavier. Vous ne pourrez pas modifier votre réponse!</a:t>
             </a:r>
           </a:p>
           <a:p>
@@ -7965,7 +8029,23 @@
                   <a:srgbClr val="38BA40"/>
                 </a:solidFill>
               </a:rPr>
-              <a:t>cela vous aidera a trouver la bonne réponse</a:t>
+              <a:t>cela vous aidera </a:t>
+            </a:r>
+            <a:r>
+              <a:rPr lang="fr-FR" sz="2000" dirty="0" smtClean="0">
+                <a:solidFill>
+                  <a:srgbClr val="38BA40"/>
+                </a:solidFill>
+              </a:rPr>
+              <a:t>à </a:t>
+            </a:r>
+            <a:r>
+              <a:rPr lang="fr-FR" sz="2000" dirty="0">
+                <a:solidFill>
+                  <a:srgbClr val="38BA40"/>
+                </a:solidFill>
+              </a:rPr>
+              <a:t>trouver la bonne réponse</a:t>
             </a:r>
             <a:r>
               <a:rPr lang="fr-FR" sz="2000" dirty="0"/>

</xml_diff>